<commit_message>
updates to ppt for presentation
</commit_message>
<xml_diff>
--- a/Snapchat Presentation.pptx
+++ b/Snapchat Presentation.pptx
@@ -9,8 +9,10 @@
     <p:sldId id="257" r:id="rId3"/>
     <p:sldId id="261" r:id="rId4"/>
     <p:sldId id="258" r:id="rId5"/>
-    <p:sldId id="259" r:id="rId6"/>
-    <p:sldId id="260" r:id="rId7"/>
+    <p:sldId id="262" r:id="rId6"/>
+    <p:sldId id="263" r:id="rId7"/>
+    <p:sldId id="259" r:id="rId8"/>
+    <p:sldId id="260" r:id="rId9"/>
   </p:sldIdLst>
   <p:sldSz cx="12192000" cy="6858000"/>
   <p:notesSz cx="6858000" cy="9144000"/>
@@ -109,6 +111,11 @@
       </a:defRPr>
     </a:lvl9pPr>
   </p:defaultTextStyle>
+  <p:extLst>
+    <p:ext uri="{EFAFB233-063F-42B5-8137-9DF3F51BA10A}">
+      <p15:sldGuideLst xmlns:p15="http://schemas.microsoft.com/office/powerpoint/2012/main"/>
+    </p:ext>
+  </p:extLst>
 </p:presentation>
 </file>
 
@@ -471,7 +478,7 @@
           </a:lstStyle>
           <a:p>
             <a:r>
-              <a:rPr lang="en-US" smtClean="0"/>
+              <a:rPr lang="en-US"/>
               <a:t>Click to edit Master title style</a:t>
             </a:r>
             <a:endParaRPr lang="en-US" dirty="0"/>
@@ -590,7 +597,7 @@
           </a:lstStyle>
           <a:p>
             <a:r>
-              <a:rPr lang="en-US" smtClean="0"/>
+              <a:rPr lang="en-US"/>
               <a:t>Click to edit Master subtitle style</a:t>
             </a:r>
             <a:endParaRPr lang="en-US" dirty="0"/>
@@ -614,7 +621,7 @@
           <a:p>
             <a:fld id="{1ECB0E41-9994-D94A-BFCC-22F2C7936D4B}" type="datetimeFigureOut">
               <a:rPr lang="en-US" smtClean="0"/>
-              <a:t>3/16/17</a:t>
+              <a:t>3/17/2017</a:t>
             </a:fld>
             <a:endParaRPr lang="en-US"/>
           </a:p>
@@ -719,7 +726,7 @@
           </a:lstStyle>
           <a:p>
             <a:r>
-              <a:rPr lang="en-US" smtClean="0"/>
+              <a:rPr lang="en-US"/>
               <a:t>Click to edit Master title style</a:t>
             </a:r>
             <a:endParaRPr lang="en-US" dirty="0"/>
@@ -814,7 +821,7 @@
           </a:lstStyle>
           <a:p>
             <a:r>
-              <a:rPr lang="en-US" smtClean="0"/>
+              <a:rPr lang="en-US"/>
               <a:t>Drag picture to placeholder or click icon to add</a:t>
             </a:r>
             <a:endParaRPr lang="en-US" dirty="0"/>
@@ -882,7 +889,7 @@
           <a:p>
             <a:pPr lvl="0"/>
             <a:r>
-              <a:rPr lang="en-US" smtClean="0"/>
+              <a:rPr lang="en-US"/>
               <a:t>Click to edit Master text styles</a:t>
             </a:r>
           </a:p>
@@ -905,7 +912,7 @@
           <a:p>
             <a:fld id="{1ECB0E41-9994-D94A-BFCC-22F2C7936D4B}" type="datetimeFigureOut">
               <a:rPr lang="en-US" smtClean="0"/>
-              <a:t>3/16/17</a:t>
+              <a:t>3/17/2017</a:t>
             </a:fld>
             <a:endParaRPr lang="en-US"/>
           </a:p>
@@ -1005,7 +1012,7 @@
           </a:lstStyle>
           <a:p>
             <a:r>
-              <a:rPr lang="en-US" smtClean="0"/>
+              <a:rPr lang="en-US"/>
               <a:t>Click to edit Master title style</a:t>
             </a:r>
             <a:endParaRPr lang="en-US" dirty="0"/>
@@ -1125,7 +1132,7 @@
           <a:p>
             <a:pPr lvl="0"/>
             <a:r>
-              <a:rPr lang="en-US" smtClean="0"/>
+              <a:rPr lang="en-US"/>
               <a:t>Click to edit Master text styles</a:t>
             </a:r>
           </a:p>
@@ -1148,7 +1155,7 @@
           <a:p>
             <a:fld id="{1ECB0E41-9994-D94A-BFCC-22F2C7936D4B}" type="datetimeFigureOut">
               <a:rPr lang="en-US" smtClean="0"/>
-              <a:t>3/16/17</a:t>
+              <a:t>3/17/2017</a:t>
             </a:fld>
             <a:endParaRPr lang="en-US"/>
           </a:p>
@@ -1484,7 +1491,7 @@
           </a:lstStyle>
           <a:p>
             <a:r>
-              <a:rPr lang="en-US" smtClean="0"/>
+              <a:rPr lang="en-US"/>
               <a:t>Click to edit Master title style</a:t>
             </a:r>
             <a:endParaRPr lang="en-US" dirty="0"/>
@@ -1541,7 +1548,7 @@
           <a:p>
             <a:pPr lvl="0"/>
             <a:r>
-              <a:rPr lang="en-US" smtClean="0"/>
+              <a:rPr lang="en-US"/>
               <a:t>Click to edit Master text styles</a:t>
             </a:r>
           </a:p>
@@ -1660,7 +1667,7 @@
           <a:p>
             <a:pPr lvl="0"/>
             <a:r>
-              <a:rPr lang="en-US" smtClean="0"/>
+              <a:rPr lang="en-US"/>
               <a:t>Click to edit Master text styles</a:t>
             </a:r>
           </a:p>
@@ -1683,7 +1690,7 @@
           <a:p>
             <a:fld id="{1ECB0E41-9994-D94A-BFCC-22F2C7936D4B}" type="datetimeFigureOut">
               <a:rPr lang="en-US" smtClean="0"/>
-              <a:t>3/16/17</a:t>
+              <a:t>3/17/2017</a:t>
             </a:fld>
             <a:endParaRPr lang="en-US"/>
           </a:p>
@@ -1783,7 +1790,7 @@
           </a:lstStyle>
           <a:p>
             <a:r>
-              <a:rPr lang="en-US" smtClean="0"/>
+              <a:rPr lang="en-US"/>
               <a:t>Click to edit Master title style</a:t>
             </a:r>
             <a:endParaRPr lang="en-US" dirty="0"/>
@@ -1903,7 +1910,7 @@
           <a:p>
             <a:pPr lvl="0"/>
             <a:r>
-              <a:rPr lang="en-US" smtClean="0"/>
+              <a:rPr lang="en-US"/>
               <a:t>Click to edit Master text styles</a:t>
             </a:r>
           </a:p>
@@ -1926,7 +1933,7 @@
           <a:p>
             <a:fld id="{1ECB0E41-9994-D94A-BFCC-22F2C7936D4B}" type="datetimeFigureOut">
               <a:rPr lang="en-US" smtClean="0"/>
-              <a:t>3/16/17</a:t>
+              <a:t>3/17/2017</a:t>
             </a:fld>
             <a:endParaRPr lang="en-US"/>
           </a:p>
@@ -2262,7 +2269,7 @@
           </a:lstStyle>
           <a:p>
             <a:r>
-              <a:rPr lang="en-US" smtClean="0"/>
+              <a:rPr lang="en-US"/>
               <a:t>Click to edit Master title style</a:t>
             </a:r>
             <a:endParaRPr lang="en-US" dirty="0"/>
@@ -2311,7 +2318,7 @@
               <a:buNone/>
             </a:pPr>
             <a:r>
-              <a:rPr lang="en-US" smtClean="0"/>
+              <a:rPr lang="en-US"/>
               <a:t>Click to edit Master text styles</a:t>
             </a:r>
           </a:p>
@@ -2430,7 +2437,7 @@
           <a:p>
             <a:pPr lvl="0"/>
             <a:r>
-              <a:rPr lang="en-US" smtClean="0"/>
+              <a:rPr lang="en-US"/>
               <a:t>Click to edit Master text styles</a:t>
             </a:r>
           </a:p>
@@ -2453,7 +2460,7 @@
           <a:p>
             <a:fld id="{1ECB0E41-9994-D94A-BFCC-22F2C7936D4B}" type="datetimeFigureOut">
               <a:rPr lang="en-US" smtClean="0"/>
-              <a:t>3/16/17</a:t>
+              <a:t>3/17/2017</a:t>
             </a:fld>
             <a:endParaRPr lang="en-US"/>
           </a:p>
@@ -2554,7 +2561,7 @@
           <a:p>
             <a:pPr marL="0" lvl="0"/>
             <a:r>
-              <a:rPr lang="en-US" smtClean="0"/>
+              <a:rPr lang="en-US"/>
               <a:t>Click to edit Master title style</a:t>
             </a:r>
             <a:endParaRPr lang="en-US" dirty="0"/>
@@ -2603,7 +2610,7 @@
               <a:buNone/>
             </a:pPr>
             <a:r>
-              <a:rPr lang="en-US" smtClean="0"/>
+              <a:rPr lang="en-US"/>
               <a:t>Click to edit Master text styles</a:t>
             </a:r>
           </a:p>
@@ -2722,7 +2729,7 @@
           <a:p>
             <a:pPr lvl="0"/>
             <a:r>
-              <a:rPr lang="en-US" smtClean="0"/>
+              <a:rPr lang="en-US"/>
               <a:t>Click to edit Master text styles</a:t>
             </a:r>
           </a:p>
@@ -2745,7 +2752,7 @@
           <a:p>
             <a:fld id="{1ECB0E41-9994-D94A-BFCC-22F2C7936D4B}" type="datetimeFigureOut">
               <a:rPr lang="en-US" smtClean="0"/>
-              <a:t>3/16/17</a:t>
+              <a:t>3/17/2017</a:t>
             </a:fld>
             <a:endParaRPr lang="en-US"/>
           </a:p>
@@ -2838,7 +2845,7 @@
           </a:lstStyle>
           <a:p>
             <a:r>
-              <a:rPr lang="en-US" smtClean="0"/>
+              <a:rPr lang="en-US"/>
               <a:t>Click to edit Master title style</a:t>
             </a:r>
             <a:endParaRPr lang="en-US" dirty="0"/>
@@ -2862,35 +2869,35 @@
           <a:p>
             <a:pPr lvl="0"/>
             <a:r>
-              <a:rPr lang="en-US" smtClean="0"/>
+              <a:rPr lang="en-US"/>
               <a:t>Click to edit Master text styles</a:t>
             </a:r>
           </a:p>
           <a:p>
             <a:pPr lvl="1"/>
             <a:r>
-              <a:rPr lang="en-US" smtClean="0"/>
+              <a:rPr lang="en-US"/>
               <a:t>Second level</a:t>
             </a:r>
           </a:p>
           <a:p>
             <a:pPr lvl="2"/>
             <a:r>
-              <a:rPr lang="en-US" smtClean="0"/>
+              <a:rPr lang="en-US"/>
               <a:t>Third level</a:t>
             </a:r>
           </a:p>
           <a:p>
             <a:pPr lvl="3"/>
             <a:r>
-              <a:rPr lang="en-US" smtClean="0"/>
+              <a:rPr lang="en-US"/>
               <a:t>Fourth level</a:t>
             </a:r>
           </a:p>
           <a:p>
             <a:pPr lvl="4"/>
             <a:r>
-              <a:rPr lang="en-US" smtClean="0"/>
+              <a:rPr lang="en-US"/>
               <a:t>Fifth level</a:t>
             </a:r>
             <a:endParaRPr lang="en-US" dirty="0"/>
@@ -2914,7 +2921,7 @@
           <a:p>
             <a:fld id="{1ECB0E41-9994-D94A-BFCC-22F2C7936D4B}" type="datetimeFigureOut">
               <a:rPr lang="en-US" smtClean="0"/>
-              <a:t>3/16/17</a:t>
+              <a:t>3/17/2017</a:t>
             </a:fld>
             <a:endParaRPr lang="en-US"/>
           </a:p>
@@ -3008,7 +3015,7 @@
           <a:lstStyle/>
           <a:p>
             <a:r>
-              <a:rPr lang="en-US" smtClean="0"/>
+              <a:rPr lang="en-US"/>
               <a:t>Click to edit Master title style</a:t>
             </a:r>
             <a:endParaRPr lang="en-US" dirty="0"/>
@@ -3037,35 +3044,35 @@
           <a:p>
             <a:pPr lvl="0"/>
             <a:r>
-              <a:rPr lang="en-US" smtClean="0"/>
+              <a:rPr lang="en-US"/>
               <a:t>Click to edit Master text styles</a:t>
             </a:r>
           </a:p>
           <a:p>
             <a:pPr lvl="1"/>
             <a:r>
-              <a:rPr lang="en-US" smtClean="0"/>
+              <a:rPr lang="en-US"/>
               <a:t>Second level</a:t>
             </a:r>
           </a:p>
           <a:p>
             <a:pPr lvl="2"/>
             <a:r>
-              <a:rPr lang="en-US" smtClean="0"/>
+              <a:rPr lang="en-US"/>
               <a:t>Third level</a:t>
             </a:r>
           </a:p>
           <a:p>
             <a:pPr lvl="3"/>
             <a:r>
-              <a:rPr lang="en-US" smtClean="0"/>
+              <a:rPr lang="en-US"/>
               <a:t>Fourth level</a:t>
             </a:r>
           </a:p>
           <a:p>
             <a:pPr lvl="4"/>
             <a:r>
-              <a:rPr lang="en-US" smtClean="0"/>
+              <a:rPr lang="en-US"/>
               <a:t>Fifth level</a:t>
             </a:r>
             <a:endParaRPr lang="en-US" dirty="0"/>
@@ -3089,7 +3096,7 @@
           <a:p>
             <a:fld id="{1ECB0E41-9994-D94A-BFCC-22F2C7936D4B}" type="datetimeFigureOut">
               <a:rPr lang="en-US" smtClean="0"/>
-              <a:t>3/16/17</a:t>
+              <a:t>3/17/2017</a:t>
             </a:fld>
             <a:endParaRPr lang="en-US"/>
           </a:p>
@@ -3178,7 +3185,7 @@
           <a:lstStyle/>
           <a:p>
             <a:r>
-              <a:rPr lang="en-US" smtClean="0"/>
+              <a:rPr lang="en-US"/>
               <a:t>Click to edit Master title style</a:t>
             </a:r>
             <a:endParaRPr lang="en-US" dirty="0"/>
@@ -3202,35 +3209,35 @@
           <a:p>
             <a:pPr lvl="0"/>
             <a:r>
-              <a:rPr lang="en-US" smtClean="0"/>
+              <a:rPr lang="en-US"/>
               <a:t>Click to edit Master text styles</a:t>
             </a:r>
           </a:p>
           <a:p>
             <a:pPr lvl="1"/>
             <a:r>
-              <a:rPr lang="en-US" smtClean="0"/>
+              <a:rPr lang="en-US"/>
               <a:t>Second level</a:t>
             </a:r>
           </a:p>
           <a:p>
             <a:pPr lvl="2"/>
             <a:r>
-              <a:rPr lang="en-US" smtClean="0"/>
+              <a:rPr lang="en-US"/>
               <a:t>Third level</a:t>
             </a:r>
           </a:p>
           <a:p>
             <a:pPr lvl="3"/>
             <a:r>
-              <a:rPr lang="en-US" smtClean="0"/>
+              <a:rPr lang="en-US"/>
               <a:t>Fourth level</a:t>
             </a:r>
           </a:p>
           <a:p>
             <a:pPr lvl="4"/>
             <a:r>
-              <a:rPr lang="en-US" smtClean="0"/>
+              <a:rPr lang="en-US"/>
               <a:t>Fifth level</a:t>
             </a:r>
             <a:endParaRPr lang="en-US" dirty="0"/>
@@ -3254,7 +3261,7 @@
           <a:p>
             <a:fld id="{1ECB0E41-9994-D94A-BFCC-22F2C7936D4B}" type="datetimeFigureOut">
               <a:rPr lang="en-US" smtClean="0"/>
-              <a:t>3/16/17</a:t>
+              <a:t>3/17/2017</a:t>
             </a:fld>
             <a:endParaRPr lang="en-US"/>
           </a:p>
@@ -3357,7 +3364,7 @@
           </a:lstStyle>
           <a:p>
             <a:r>
-              <a:rPr lang="en-US" smtClean="0"/>
+              <a:rPr lang="en-US"/>
               <a:t>Click to edit Master title style</a:t>
             </a:r>
             <a:endParaRPr lang="en-US" dirty="0"/>
@@ -3477,7 +3484,7 @@
           <a:p>
             <a:pPr lvl="0"/>
             <a:r>
-              <a:rPr lang="en-US" smtClean="0"/>
+              <a:rPr lang="en-US"/>
               <a:t>Click to edit Master text styles</a:t>
             </a:r>
           </a:p>
@@ -3500,7 +3507,7 @@
           <a:p>
             <a:fld id="{1ECB0E41-9994-D94A-BFCC-22F2C7936D4B}" type="datetimeFigureOut">
               <a:rPr lang="en-US" smtClean="0"/>
-              <a:t>3/16/17</a:t>
+              <a:t>3/17/2017</a:t>
             </a:fld>
             <a:endParaRPr lang="en-US"/>
           </a:p>
@@ -3594,7 +3601,7 @@
           <a:lstStyle/>
           <a:p>
             <a:r>
-              <a:rPr lang="en-US" smtClean="0"/>
+              <a:rPr lang="en-US"/>
               <a:t>Click to edit Master title style</a:t>
             </a:r>
             <a:endParaRPr lang="en-US" dirty="0"/>
@@ -3653,35 +3660,35 @@
           <a:p>
             <a:pPr lvl="0"/>
             <a:r>
-              <a:rPr lang="en-US" smtClean="0"/>
+              <a:rPr lang="en-US"/>
               <a:t>Click to edit Master text styles</a:t>
             </a:r>
           </a:p>
           <a:p>
             <a:pPr lvl="1"/>
             <a:r>
-              <a:rPr lang="en-US" smtClean="0"/>
+              <a:rPr lang="en-US"/>
               <a:t>Second level</a:t>
             </a:r>
           </a:p>
           <a:p>
             <a:pPr lvl="2"/>
             <a:r>
-              <a:rPr lang="en-US" smtClean="0"/>
+              <a:rPr lang="en-US"/>
               <a:t>Third level</a:t>
             </a:r>
           </a:p>
           <a:p>
             <a:pPr lvl="3"/>
             <a:r>
-              <a:rPr lang="en-US" smtClean="0"/>
+              <a:rPr lang="en-US"/>
               <a:t>Fourth level</a:t>
             </a:r>
           </a:p>
           <a:p>
             <a:pPr lvl="4"/>
             <a:r>
-              <a:rPr lang="en-US" smtClean="0"/>
+              <a:rPr lang="en-US"/>
               <a:t>Fifth level</a:t>
             </a:r>
             <a:endParaRPr lang="en-US" dirty="0"/>
@@ -3740,35 +3747,35 @@
           <a:p>
             <a:pPr lvl="0"/>
             <a:r>
-              <a:rPr lang="en-US" smtClean="0"/>
+              <a:rPr lang="en-US"/>
               <a:t>Click to edit Master text styles</a:t>
             </a:r>
           </a:p>
           <a:p>
             <a:pPr lvl="1"/>
             <a:r>
-              <a:rPr lang="en-US" smtClean="0"/>
+              <a:rPr lang="en-US"/>
               <a:t>Second level</a:t>
             </a:r>
           </a:p>
           <a:p>
             <a:pPr lvl="2"/>
             <a:r>
-              <a:rPr lang="en-US" smtClean="0"/>
+              <a:rPr lang="en-US"/>
               <a:t>Third level</a:t>
             </a:r>
           </a:p>
           <a:p>
             <a:pPr lvl="3"/>
             <a:r>
-              <a:rPr lang="en-US" smtClean="0"/>
+              <a:rPr lang="en-US"/>
               <a:t>Fourth level</a:t>
             </a:r>
           </a:p>
           <a:p>
             <a:pPr lvl="4"/>
             <a:r>
-              <a:rPr lang="en-US" smtClean="0"/>
+              <a:rPr lang="en-US"/>
               <a:t>Fifth level</a:t>
             </a:r>
             <a:endParaRPr lang="en-US" dirty="0"/>
@@ -3792,7 +3799,7 @@
           <a:p>
             <a:fld id="{1ECB0E41-9994-D94A-BFCC-22F2C7936D4B}" type="datetimeFigureOut">
               <a:rPr lang="en-US" smtClean="0"/>
-              <a:t>3/16/17</a:t>
+              <a:t>3/17/2017</a:t>
             </a:fld>
             <a:endParaRPr lang="en-US"/>
           </a:p>
@@ -3885,7 +3892,7 @@
           </a:lstStyle>
           <a:p>
             <a:r>
-              <a:rPr lang="en-US" smtClean="0"/>
+              <a:rPr lang="en-US"/>
               <a:t>Click to edit Master title style</a:t>
             </a:r>
             <a:endParaRPr lang="en-US" dirty="0"/>
@@ -3959,7 +3966,7 @@
           <a:p>
             <a:pPr lvl="0"/>
             <a:r>
-              <a:rPr lang="en-US" smtClean="0"/>
+              <a:rPr lang="en-US"/>
               <a:t>Click to edit Master text styles</a:t>
             </a:r>
           </a:p>
@@ -4017,35 +4024,35 @@
           <a:p>
             <a:pPr lvl="0"/>
             <a:r>
-              <a:rPr lang="en-US" smtClean="0"/>
+              <a:rPr lang="en-US"/>
               <a:t>Click to edit Master text styles</a:t>
             </a:r>
           </a:p>
           <a:p>
             <a:pPr lvl="1"/>
             <a:r>
-              <a:rPr lang="en-US" smtClean="0"/>
+              <a:rPr lang="en-US"/>
               <a:t>Second level</a:t>
             </a:r>
           </a:p>
           <a:p>
             <a:pPr lvl="2"/>
             <a:r>
-              <a:rPr lang="en-US" smtClean="0"/>
+              <a:rPr lang="en-US"/>
               <a:t>Third level</a:t>
             </a:r>
           </a:p>
           <a:p>
             <a:pPr lvl="3"/>
             <a:r>
-              <a:rPr lang="en-US" smtClean="0"/>
+              <a:rPr lang="en-US"/>
               <a:t>Fourth level</a:t>
             </a:r>
           </a:p>
           <a:p>
             <a:pPr lvl="4"/>
             <a:r>
-              <a:rPr lang="en-US" smtClean="0"/>
+              <a:rPr lang="en-US"/>
               <a:t>Fifth level</a:t>
             </a:r>
             <a:endParaRPr lang="en-US" dirty="0"/>
@@ -4119,7 +4126,7 @@
           <a:p>
             <a:pPr lvl="0"/>
             <a:r>
-              <a:rPr lang="en-US" smtClean="0"/>
+              <a:rPr lang="en-US"/>
               <a:t>Click to edit Master text styles</a:t>
             </a:r>
           </a:p>
@@ -4177,35 +4184,35 @@
           <a:p>
             <a:pPr lvl="0"/>
             <a:r>
-              <a:rPr lang="en-US" smtClean="0"/>
+              <a:rPr lang="en-US"/>
               <a:t>Click to edit Master text styles</a:t>
             </a:r>
           </a:p>
           <a:p>
             <a:pPr lvl="1"/>
             <a:r>
-              <a:rPr lang="en-US" smtClean="0"/>
+              <a:rPr lang="en-US"/>
               <a:t>Second level</a:t>
             </a:r>
           </a:p>
           <a:p>
             <a:pPr lvl="2"/>
             <a:r>
-              <a:rPr lang="en-US" smtClean="0"/>
+              <a:rPr lang="en-US"/>
               <a:t>Third level</a:t>
             </a:r>
           </a:p>
           <a:p>
             <a:pPr lvl="3"/>
             <a:r>
-              <a:rPr lang="en-US" smtClean="0"/>
+              <a:rPr lang="en-US"/>
               <a:t>Fourth level</a:t>
             </a:r>
           </a:p>
           <a:p>
             <a:pPr lvl="4"/>
             <a:r>
-              <a:rPr lang="en-US" smtClean="0"/>
+              <a:rPr lang="en-US"/>
               <a:t>Fifth level</a:t>
             </a:r>
             <a:endParaRPr lang="en-US" dirty="0"/>
@@ -4229,7 +4236,7 @@
           <a:p>
             <a:fld id="{1ECB0E41-9994-D94A-BFCC-22F2C7936D4B}" type="datetimeFigureOut">
               <a:rPr lang="en-US" smtClean="0"/>
-              <a:t>3/16/17</a:t>
+              <a:t>3/17/2017</a:t>
             </a:fld>
             <a:endParaRPr lang="en-US"/>
           </a:p>
@@ -4318,7 +4325,7 @@
           <a:lstStyle/>
           <a:p>
             <a:r>
-              <a:rPr lang="en-US" smtClean="0"/>
+              <a:rPr lang="en-US"/>
               <a:t>Click to edit Master title style</a:t>
             </a:r>
             <a:endParaRPr lang="en-US" dirty="0"/>
@@ -4342,7 +4349,7 @@
           <a:p>
             <a:fld id="{1ECB0E41-9994-D94A-BFCC-22F2C7936D4B}" type="datetimeFigureOut">
               <a:rPr lang="en-US" smtClean="0"/>
-              <a:t>3/16/17</a:t>
+              <a:t>3/17/2017</a:t>
             </a:fld>
             <a:endParaRPr lang="en-US"/>
           </a:p>
@@ -4432,7 +4439,7 @@
           <a:p>
             <a:fld id="{1ECB0E41-9994-D94A-BFCC-22F2C7936D4B}" type="datetimeFigureOut">
               <a:rPr lang="en-US" smtClean="0"/>
-              <a:t>3/16/17</a:t>
+              <a:t>3/17/2017</a:t>
             </a:fld>
             <a:endParaRPr lang="en-US"/>
           </a:p>
@@ -4532,7 +4539,7 @@
           </a:lstStyle>
           <a:p>
             <a:r>
-              <a:rPr lang="en-US" smtClean="0"/>
+              <a:rPr lang="en-US"/>
               <a:t>Click to edit Master title style</a:t>
             </a:r>
             <a:endParaRPr lang="en-US" dirty="0"/>
@@ -4591,35 +4598,35 @@
           <a:p>
             <a:pPr lvl="0"/>
             <a:r>
-              <a:rPr lang="en-US" smtClean="0"/>
+              <a:rPr lang="en-US"/>
               <a:t>Click to edit Master text styles</a:t>
             </a:r>
           </a:p>
           <a:p>
             <a:pPr lvl="1"/>
             <a:r>
-              <a:rPr lang="en-US" smtClean="0"/>
+              <a:rPr lang="en-US"/>
               <a:t>Second level</a:t>
             </a:r>
           </a:p>
           <a:p>
             <a:pPr lvl="2"/>
             <a:r>
-              <a:rPr lang="en-US" smtClean="0"/>
+              <a:rPr lang="en-US"/>
               <a:t>Third level</a:t>
             </a:r>
           </a:p>
           <a:p>
             <a:pPr lvl="3"/>
             <a:r>
-              <a:rPr lang="en-US" smtClean="0"/>
+              <a:rPr lang="en-US"/>
               <a:t>Fourth level</a:t>
             </a:r>
           </a:p>
           <a:p>
             <a:pPr lvl="4"/>
             <a:r>
-              <a:rPr lang="en-US" smtClean="0"/>
+              <a:rPr lang="en-US"/>
               <a:t>Fifth level</a:t>
             </a:r>
             <a:endParaRPr lang="en-US" dirty="0"/>
@@ -4687,7 +4694,7 @@
           <a:p>
             <a:pPr lvl="0"/>
             <a:r>
-              <a:rPr lang="en-US" smtClean="0"/>
+              <a:rPr lang="en-US"/>
               <a:t>Click to edit Master text styles</a:t>
             </a:r>
           </a:p>
@@ -4710,7 +4717,7 @@
           <a:p>
             <a:fld id="{1ECB0E41-9994-D94A-BFCC-22F2C7936D4B}" type="datetimeFigureOut">
               <a:rPr lang="en-US" smtClean="0"/>
-              <a:t>3/16/17</a:t>
+              <a:t>3/17/2017</a:t>
             </a:fld>
             <a:endParaRPr lang="en-US"/>
           </a:p>
@@ -4810,7 +4817,7 @@
           </a:lstStyle>
           <a:p>
             <a:r>
-              <a:rPr lang="en-US" smtClean="0"/>
+              <a:rPr lang="en-US"/>
               <a:t>Click to edit Master title style</a:t>
             </a:r>
             <a:endParaRPr lang="en-US" dirty="0"/>
@@ -4905,7 +4912,7 @@
           </a:lstStyle>
           <a:p>
             <a:r>
-              <a:rPr lang="en-US" smtClean="0"/>
+              <a:rPr lang="en-US"/>
               <a:t>Drag picture to placeholder or click icon to add</a:t>
             </a:r>
             <a:endParaRPr lang="en-US" dirty="0"/>
@@ -4973,7 +4980,7 @@
           <a:p>
             <a:pPr lvl="0"/>
             <a:r>
-              <a:rPr lang="en-US" smtClean="0"/>
+              <a:rPr lang="en-US"/>
               <a:t>Click to edit Master text styles</a:t>
             </a:r>
           </a:p>
@@ -4996,7 +5003,7 @@
           <a:p>
             <a:fld id="{1ECB0E41-9994-D94A-BFCC-22F2C7936D4B}" type="datetimeFigureOut">
               <a:rPr lang="en-US" smtClean="0"/>
-              <a:t>3/16/17</a:t>
+              <a:t>3/17/2017</a:t>
             </a:fld>
             <a:endParaRPr lang="en-US"/>
           </a:p>
@@ -5417,7 +5424,7 @@
           <a:lstStyle/>
           <a:p>
             <a:r>
-              <a:rPr lang="en-US" smtClean="0"/>
+              <a:rPr lang="en-US"/>
               <a:t>Click to edit Master title style</a:t>
             </a:r>
             <a:endParaRPr lang="en-US" dirty="0"/>
@@ -5451,35 +5458,35 @@
           <a:p>
             <a:pPr lvl="0"/>
             <a:r>
-              <a:rPr lang="en-US" smtClean="0"/>
+              <a:rPr lang="en-US"/>
               <a:t>Click to edit Master text styles</a:t>
             </a:r>
           </a:p>
           <a:p>
             <a:pPr lvl="1"/>
             <a:r>
-              <a:rPr lang="en-US" smtClean="0"/>
+              <a:rPr lang="en-US"/>
               <a:t>Second level</a:t>
             </a:r>
           </a:p>
           <a:p>
             <a:pPr lvl="2"/>
             <a:r>
-              <a:rPr lang="en-US" smtClean="0"/>
+              <a:rPr lang="en-US"/>
               <a:t>Third level</a:t>
             </a:r>
           </a:p>
           <a:p>
             <a:pPr lvl="3"/>
             <a:r>
-              <a:rPr lang="en-US" smtClean="0"/>
+              <a:rPr lang="en-US"/>
               <a:t>Fourth level</a:t>
             </a:r>
           </a:p>
           <a:p>
             <a:pPr lvl="4"/>
             <a:r>
-              <a:rPr lang="en-US" smtClean="0"/>
+              <a:rPr lang="en-US"/>
               <a:t>Fifth level</a:t>
             </a:r>
             <a:endParaRPr lang="en-US" dirty="0"/>
@@ -5521,7 +5528,7 @@
           <a:p>
             <a:fld id="{1ECB0E41-9994-D94A-BFCC-22F2C7936D4B}" type="datetimeFigureOut">
               <a:rPr lang="en-US" smtClean="0"/>
-              <a:t>3/16/17</a:t>
+              <a:t>3/17/2017</a:t>
             </a:fld>
             <a:endParaRPr lang="en-US"/>
           </a:p>
@@ -6093,17 +6100,17 @@
           <a:lstStyle/>
           <a:p>
             <a:r>
-              <a:rPr lang="en-US" dirty="0" smtClean="0"/>
+              <a:rPr lang="en-US" dirty="0"/>
               <a:t>Matt Giovannucci</a:t>
             </a:r>
           </a:p>
           <a:p>
             <a:r>
-              <a:rPr lang="en-US" dirty="0" smtClean="0"/>
+              <a:rPr lang="en-US" dirty="0"/>
               <a:t>David </a:t>
             </a:r>
             <a:r>
-              <a:rPr lang="en-US" dirty="0" err="1" smtClean="0"/>
+              <a:rPr lang="en-US" dirty="0" err="1"/>
               <a:t>Tigreros</a:t>
             </a:r>
             <a:endParaRPr lang="en-US" dirty="0"/>
@@ -6120,13 +6127,6 @@
   <p:clrMapOvr>
     <a:masterClrMapping/>
   </p:clrMapOvr>
-  <p:timing>
-    <p:tnLst>
-      <p:par>
-        <p:cTn id="1" dur="indefinite" restart="never" nodeType="tmRoot"/>
-      </p:par>
-    </p:tnLst>
-  </p:timing>
 </p:sld>
 </file>
 
@@ -6180,55 +6180,15 @@
           <p:nvPr/>
         </p:nvPicPr>
         <p:blipFill>
-          <a:blip r:embed="rId3">
-            <a:extLst>
-              <a:ext uri="{28A0092B-C50C-407E-A947-70E740481C1C}">
-                <a14:useLocalDpi xmlns:a14="http://schemas.microsoft.com/office/drawing/2010/main" val="0"/>
-              </a:ext>
-            </a:extLst>
-          </a:blip>
-          <a:srcRect/>
+          <a:blip r:embed="rId3"/>
           <a:stretch>
             <a:fillRect/>
           </a:stretch>
         </p:blipFill>
         <p:spPr bwMode="auto">
           <a:xfrm>
-            <a:off x="4543291" y="111699"/>
-            <a:ext cx="3789613" cy="6746301"/>
-          </a:xfrm>
-          <a:prstGeom prst="rect">
-            <a:avLst/>
-          </a:prstGeom>
-          <a:noFill/>
-          <a:ln>
-            <a:noFill/>
-          </a:ln>
-        </p:spPr>
-      </p:pic>
-      <p:pic>
-        <p:nvPicPr>
-          <p:cNvPr id="5" name="Picture 4"/>
-          <p:cNvPicPr>
-            <a:picLocks noChangeAspect="1"/>
-          </p:cNvPicPr>
-          <p:nvPr/>
-        </p:nvPicPr>
-        <p:blipFill rotWithShape="1">
-          <a:blip r:embed="rId4">
-            <a:extLst>
-              <a:ext uri="{28A0092B-C50C-407E-A947-70E740481C1C}">
-                <a14:useLocalDpi xmlns:a14="http://schemas.microsoft.com/office/drawing/2010/main" val="0"/>
-              </a:ext>
-            </a:extLst>
-          </a:blip>
-          <a:srcRect t="41508" b="53099"/>
-          <a:stretch/>
-        </p:blipFill>
-        <p:spPr bwMode="auto">
-          <a:xfrm>
-            <a:off x="4543293" y="2834730"/>
-            <a:ext cx="3789612" cy="363803"/>
+            <a:off x="4250328" y="54770"/>
+            <a:ext cx="3789613" cy="6740458"/>
           </a:xfrm>
           <a:prstGeom prst="rect">
             <a:avLst/>
@@ -6345,108 +6305,6 @@
                             </p:childTnLst>
                           </p:cTn>
                         </p:par>
-                        <p:par>
-                          <p:cTn id="9" fill="hold">
-                            <p:stCondLst>
-                              <p:cond delay="500"/>
-                            </p:stCondLst>
-                            <p:childTnLst>
-                              <p:par>
-                                <p:cTn id="10" presetID="2" presetClass="exit" presetSubtype="8" fill="hold" nodeType="afterEffect">
-                                  <p:stCondLst>
-                                    <p:cond delay="0"/>
-                                  </p:stCondLst>
-                                  <p:childTnLst>
-                                    <p:anim calcmode="lin" valueType="num">
-                                      <p:cBhvr additive="base">
-                                        <p:cTn id="11" dur="1000"/>
-                                        <p:tgtEl>
-                                          <p:spTgt spid="5"/>
-                                        </p:tgtEl>
-                                        <p:attrNameLst>
-                                          <p:attrName>ppt_x</p:attrName>
-                                        </p:attrNameLst>
-                                      </p:cBhvr>
-                                      <p:tavLst>
-                                        <p:tav tm="0">
-                                          <p:val>
-                                            <p:strVal val="ppt_x"/>
-                                          </p:val>
-                                        </p:tav>
-                                        <p:tav tm="100000">
-                                          <p:val>
-                                            <p:strVal val="0-ppt_w/2"/>
-                                          </p:val>
-                                        </p:tav>
-                                      </p:tavLst>
-                                    </p:anim>
-                                    <p:anim calcmode="lin" valueType="num">
-                                      <p:cBhvr additive="base">
-                                        <p:cTn id="12" dur="1000"/>
-                                        <p:tgtEl>
-                                          <p:spTgt spid="5"/>
-                                        </p:tgtEl>
-                                        <p:attrNameLst>
-                                          <p:attrName>ppt_y</p:attrName>
-                                        </p:attrNameLst>
-                                      </p:cBhvr>
-                                      <p:tavLst>
-                                        <p:tav tm="0">
-                                          <p:val>
-                                            <p:strVal val="ppt_y"/>
-                                          </p:val>
-                                        </p:tav>
-                                        <p:tav tm="100000">
-                                          <p:val>
-                                            <p:strVal val="ppt_y"/>
-                                          </p:val>
-                                        </p:tav>
-                                      </p:tavLst>
-                                    </p:anim>
-                                    <p:set>
-                                      <p:cBhvr>
-                                        <p:cTn id="13" dur="1" fill="hold">
-                                          <p:stCondLst>
-                                            <p:cond delay="999"/>
-                                          </p:stCondLst>
-                                        </p:cTn>
-                                        <p:tgtEl>
-                                          <p:spTgt spid="5"/>
-                                        </p:tgtEl>
-                                        <p:attrNameLst>
-                                          <p:attrName>style.visibility</p:attrName>
-                                        </p:attrNameLst>
-                                      </p:cBhvr>
-                                      <p:to>
-                                        <p:strVal val="hidden"/>
-                                      </p:to>
-                                    </p:set>
-                                  </p:childTnLst>
-                                </p:cTn>
-                              </p:par>
-                              <p:par>
-                                <p:cTn id="14" presetID="8" presetClass="emph" presetSubtype="0" fill="hold" nodeType="withEffect">
-                                  <p:stCondLst>
-                                    <p:cond delay="0"/>
-                                  </p:stCondLst>
-                                  <p:childTnLst>
-                                    <p:animRot by="21600000">
-                                      <p:cBhvr>
-                                        <p:cTn id="15" dur="2000" fill="hold"/>
-                                        <p:tgtEl>
-                                          <p:spTgt spid="5"/>
-                                        </p:tgtEl>
-                                        <p:attrNameLst>
-                                          <p:attrName>r</p:attrName>
-                                        </p:attrNameLst>
-                                      </p:cBhvr>
-                                    </p:animRot>
-                                  </p:childTnLst>
-                                </p:cTn>
-                              </p:par>
-                            </p:childTnLst>
-                          </p:cTn>
-                        </p:par>
                       </p:childTnLst>
                     </p:cTn>
                   </p:par>
@@ -6508,14 +6366,13 @@
           <a:lstStyle/>
           <a:p>
             <a:r>
-              <a:rPr lang="en-US" smtClean="0"/>
+              <a:rPr lang="en-US"/>
               <a:t>Several Pre-existing </a:t>
             </a:r>
             <a:r>
-              <a:rPr lang="en-US" dirty="0" smtClean="0"/>
+              <a:rPr lang="en-US" dirty="0"/>
               <a:t>methods</a:t>
             </a:r>
-            <a:endParaRPr lang="en-US" dirty="0"/>
           </a:p>
         </p:txBody>
       </p:sp>
@@ -6535,29 +6392,29 @@
           <a:lstStyle/>
           <a:p>
             <a:r>
-              <a:rPr lang="en-US" dirty="0" err="1" smtClean="0"/>
+              <a:rPr lang="en-US" dirty="0" err="1"/>
               <a:t>CapSnap</a:t>
             </a:r>
             <a:r>
-              <a:rPr lang="en-US" dirty="0" smtClean="0"/>
+              <a:rPr lang="en-US" dirty="0"/>
               <a:t>, Python Based program</a:t>
             </a:r>
           </a:p>
           <a:p>
             <a:r>
-              <a:rPr lang="en-US" dirty="0" err="1" smtClean="0"/>
+              <a:rPr lang="en-US" dirty="0" err="1"/>
               <a:t>CaptionClean</a:t>
             </a:r>
             <a:r>
-              <a:rPr lang="en-US" dirty="0" smtClean="0"/>
+              <a:rPr lang="en-US" dirty="0"/>
               <a:t> </a:t>
             </a:r>
             <a:r>
-              <a:rPr lang="mr-IN" dirty="0" smtClean="0"/>
+              <a:rPr lang="mr-IN" dirty="0"/>
               <a:t>–</a:t>
             </a:r>
             <a:r>
-              <a:rPr lang="en-US" dirty="0" smtClean="0"/>
+              <a:rPr lang="en-US" dirty="0"/>
               <a:t> iPhone App</a:t>
             </a:r>
           </a:p>
@@ -6576,13 +6433,6 @@
   <p:clrMapOvr>
     <a:masterClrMapping/>
   </p:clrMapOvr>
-  <p:timing>
-    <p:tnLst>
-      <p:par>
-        <p:cTn id="1" dur="indefinite" restart="never" nodeType="tmRoot"/>
-      </p:par>
-    </p:tnLst>
-  </p:timing>
 </p:sld>
 </file>
 
@@ -6624,10 +6474,9 @@
           <a:lstStyle/>
           <a:p>
             <a:r>
-              <a:rPr lang="en-US" dirty="0" smtClean="0"/>
+              <a:rPr lang="en-US" dirty="0"/>
               <a:t>Isolating Snapchat bar</a:t>
             </a:r>
-            <a:endParaRPr lang="en-US" dirty="0"/>
           </a:p>
         </p:txBody>
       </p:sp>
@@ -6652,16 +6501,15 @@
           <a:lstStyle/>
           <a:p>
             <a:r>
-              <a:rPr lang="en-US" dirty="0" smtClean="0"/>
+              <a:rPr lang="en-US" dirty="0"/>
               <a:t>Using the Hough transform to find straight lines within picture</a:t>
             </a:r>
           </a:p>
           <a:p>
             <a:r>
-              <a:rPr lang="en-US" dirty="0" smtClean="0"/>
+              <a:rPr lang="en-US" dirty="0"/>
               <a:t>Filter the lines to only look for horizontal lines</a:t>
             </a:r>
-            <a:endParaRPr lang="en-US" dirty="0"/>
           </a:p>
         </p:txBody>
       </p:sp>
@@ -6673,23 +6521,15 @@
           </p:cNvPicPr>
           <p:nvPr/>
         </p:nvPicPr>
-        <p:blipFill>
-          <a:blip r:embed="rId2">
-            <a:extLst>
-              <a:ext uri="{28A0092B-C50C-407E-A947-70E740481C1C}">
-                <a14:useLocalDpi xmlns:a14="http://schemas.microsoft.com/office/drawing/2010/main" val="0"/>
-              </a:ext>
-            </a:extLst>
-          </a:blip>
-          <a:srcRect/>
-          <a:stretch>
-            <a:fillRect/>
-          </a:stretch>
+        <p:blipFill rotWithShape="1">
+          <a:blip r:embed="rId2"/>
+          <a:srcRect l="15635" t="3788" r="15572" b="8093"/>
+          <a:stretch/>
         </p:blipFill>
         <p:spPr bwMode="auto">
           <a:xfrm>
-            <a:off x="2129426" y="192538"/>
-            <a:ext cx="3471392" cy="6197266"/>
+            <a:off x="2059620" y="319597"/>
+            <a:ext cx="3364638" cy="6003814"/>
           </a:xfrm>
           <a:prstGeom prst="rect">
             <a:avLst/>
@@ -6710,13 +6550,6 @@
   <p:clrMapOvr>
     <a:masterClrMapping/>
   </p:clrMapOvr>
-  <p:timing>
-    <p:tnLst>
-      <p:par>
-        <p:cTn id="1" dur="indefinite" restart="never" nodeType="tmRoot"/>
-      </p:par>
-    </p:tnLst>
-  </p:timing>
 </p:sld>
 </file>
 
@@ -6749,6 +6582,241 @@
         </p:nvSpPr>
         <p:spPr>
           <a:xfrm>
+            <a:off x="5849655" y="685800"/>
+            <a:ext cx="5653369" cy="1756775"/>
+          </a:xfrm>
+        </p:spPr>
+        <p:txBody>
+          <a:bodyPr/>
+          <a:lstStyle/>
+          <a:p>
+            <a:r>
+              <a:rPr lang="en-US" dirty="0"/>
+              <a:t>Isolating The Text</a:t>
+            </a:r>
+          </a:p>
+        </p:txBody>
+      </p:sp>
+      <p:sp>
+        <p:nvSpPr>
+          <p:cNvPr id="3" name="Content Placeholder 2"/>
+          <p:cNvSpPr>
+            <a:spLocks noGrp="1"/>
+          </p:cNvSpPr>
+          <p:nvPr>
+            <p:ph idx="1"/>
+          </p:nvPr>
+        </p:nvSpPr>
+        <p:spPr>
+          <a:xfrm>
+            <a:off x="5849655" y="2705622"/>
+            <a:ext cx="5653368" cy="3085578"/>
+          </a:xfrm>
+        </p:spPr>
+        <p:txBody>
+          <a:bodyPr/>
+          <a:lstStyle/>
+          <a:p>
+            <a:r>
+              <a:rPr lang="en-US" dirty="0"/>
+              <a:t>Binarize image so that there is high contrast between text and the rest of the image (similar to Lab 6)</a:t>
+            </a:r>
+          </a:p>
+          <a:p>
+            <a:r>
+              <a:rPr lang="en-US" dirty="0"/>
+              <a:t>Use caption box boundary to ensure only the text is isolated</a:t>
+            </a:r>
+          </a:p>
+        </p:txBody>
+      </p:sp>
+      <p:pic>
+        <p:nvPicPr>
+          <p:cNvPr id="6" name="Picture 5"/>
+          <p:cNvPicPr>
+            <a:picLocks noChangeAspect="1"/>
+          </p:cNvPicPr>
+          <p:nvPr/>
+        </p:nvPicPr>
+        <p:blipFill rotWithShape="1">
+          <a:blip r:embed="rId2"/>
+          <a:srcRect l="15617" t="1225" r="15379" b="8220"/>
+          <a:stretch/>
+        </p:blipFill>
+        <p:spPr>
+          <a:xfrm>
+            <a:off x="2210539" y="172753"/>
+            <a:ext cx="3397068" cy="6210292"/>
+          </a:xfrm>
+          <a:prstGeom prst="rect">
+            <a:avLst/>
+          </a:prstGeom>
+        </p:spPr>
+      </p:pic>
+    </p:spTree>
+    <p:extLst>
+      <p:ext uri="{BB962C8B-B14F-4D97-AF65-F5344CB8AC3E}">
+        <p14:creationId xmlns:p14="http://schemas.microsoft.com/office/powerpoint/2010/main" val="3002348756"/>
+      </p:ext>
+    </p:extLst>
+  </p:cSld>
+  <p:clrMapOvr>
+    <a:masterClrMapping/>
+  </p:clrMapOvr>
+</p:sld>
+</file>
+
+<file path=ppt/slides/slide6.xml><?xml version="1.0" encoding="utf-8"?>
+<p:sld xmlns:a="http://schemas.openxmlformats.org/drawingml/2006/main" xmlns:r="http://schemas.openxmlformats.org/officeDocument/2006/relationships" xmlns:p="http://schemas.openxmlformats.org/presentationml/2006/main">
+  <p:cSld>
+    <p:spTree>
+      <p:nvGrpSpPr>
+        <p:cNvPr id="1" name=""/>
+        <p:cNvGrpSpPr/>
+        <p:nvPr/>
+      </p:nvGrpSpPr>
+      <p:grpSpPr>
+        <a:xfrm>
+          <a:off x="0" y="0"/>
+          <a:ext cx="0" cy="0"/>
+          <a:chOff x="0" y="0"/>
+          <a:chExt cx="0" cy="0"/>
+        </a:xfrm>
+      </p:grpSpPr>
+      <p:sp>
+        <p:nvSpPr>
+          <p:cNvPr id="2" name="Title 1"/>
+          <p:cNvSpPr>
+            <a:spLocks noGrp="1"/>
+          </p:cNvSpPr>
+          <p:nvPr>
+            <p:ph type="title"/>
+          </p:nvPr>
+        </p:nvSpPr>
+        <p:spPr>
+          <a:xfrm>
+            <a:off x="833773" y="570390"/>
+            <a:ext cx="5653369" cy="1756775"/>
+          </a:xfrm>
+        </p:spPr>
+        <p:txBody>
+          <a:bodyPr/>
+          <a:lstStyle/>
+          <a:p>
+            <a:r>
+              <a:rPr lang="en-US" dirty="0"/>
+              <a:t>Removing The Text</a:t>
+            </a:r>
+          </a:p>
+        </p:txBody>
+      </p:sp>
+      <p:sp>
+        <p:nvSpPr>
+          <p:cNvPr id="3" name="Content Placeholder 2"/>
+          <p:cNvSpPr>
+            <a:spLocks noGrp="1"/>
+          </p:cNvSpPr>
+          <p:nvPr>
+            <p:ph idx="1"/>
+          </p:nvPr>
+        </p:nvSpPr>
+        <p:spPr>
+          <a:xfrm>
+            <a:off x="1073210" y="2519190"/>
+            <a:ext cx="5217634" cy="3085578"/>
+          </a:xfrm>
+        </p:spPr>
+        <p:txBody>
+          <a:bodyPr>
+            <a:normAutofit lnSpcReduction="10000"/>
+          </a:bodyPr>
+          <a:lstStyle/>
+          <a:p>
+            <a:r>
+              <a:rPr lang="en-US" dirty="0"/>
+              <a:t>Using text pixel values identify text region boundary</a:t>
+            </a:r>
+          </a:p>
+          <a:p>
+            <a:r>
+              <a:rPr lang="en-US" dirty="0"/>
+              <a:t>Fill in specified region in image using inward interpolation (must be grayscale)</a:t>
+            </a:r>
+          </a:p>
+          <a:p>
+            <a:r>
+              <a:rPr lang="en-US" dirty="0"/>
+              <a:t>Replace RGB values of grayscale image with values of original pixels, except in text region</a:t>
+            </a:r>
+            <a:endParaRPr lang="en-US" dirty="0"/>
+          </a:p>
+        </p:txBody>
+      </p:sp>
+      <p:pic>
+        <p:nvPicPr>
+          <p:cNvPr id="6" name="Picture 5"/>
+          <p:cNvPicPr>
+            <a:picLocks noChangeAspect="1"/>
+          </p:cNvPicPr>
+          <p:nvPr/>
+        </p:nvPicPr>
+        <p:blipFill rotWithShape="1">
+          <a:blip r:embed="rId2"/>
+          <a:srcRect l="7263" t="4097" r="8498" b="11884"/>
+          <a:stretch/>
+        </p:blipFill>
+        <p:spPr>
+          <a:xfrm>
+            <a:off x="6290844" y="950285"/>
+            <a:ext cx="5808691" cy="4345174"/>
+          </a:xfrm>
+          <a:prstGeom prst="rect">
+            <a:avLst/>
+          </a:prstGeom>
+        </p:spPr>
+      </p:pic>
+    </p:spTree>
+    <p:extLst>
+      <p:ext uri="{BB962C8B-B14F-4D97-AF65-F5344CB8AC3E}">
+        <p14:creationId xmlns:p14="http://schemas.microsoft.com/office/powerpoint/2010/main" val="3280965722"/>
+      </p:ext>
+    </p:extLst>
+  </p:cSld>
+  <p:clrMapOvr>
+    <a:masterClrMapping/>
+  </p:clrMapOvr>
+</p:sld>
+</file>
+
+<file path=ppt/slides/slide7.xml><?xml version="1.0" encoding="utf-8"?>
+<p:sld xmlns:a="http://schemas.openxmlformats.org/drawingml/2006/main" xmlns:r="http://schemas.openxmlformats.org/officeDocument/2006/relationships" xmlns:p="http://schemas.openxmlformats.org/presentationml/2006/main">
+  <p:cSld>
+    <p:spTree>
+      <p:nvGrpSpPr>
+        <p:cNvPr id="1" name=""/>
+        <p:cNvGrpSpPr/>
+        <p:nvPr/>
+      </p:nvGrpSpPr>
+      <p:grpSpPr>
+        <a:xfrm>
+          <a:off x="0" y="0"/>
+          <a:ext cx="0" cy="0"/>
+          <a:chOff x="0" y="0"/>
+          <a:chExt cx="0" cy="0"/>
+        </a:xfrm>
+      </p:grpSpPr>
+      <p:sp>
+        <p:nvSpPr>
+          <p:cNvPr id="2" name="Title 1"/>
+          <p:cNvSpPr>
+            <a:spLocks noGrp="1"/>
+          </p:cNvSpPr>
+          <p:nvPr>
+            <p:ph type="title"/>
+          </p:nvPr>
+        </p:nvSpPr>
+        <p:spPr>
+          <a:xfrm>
             <a:off x="1484311" y="814192"/>
             <a:ext cx="6883075" cy="1624207"/>
           </a:xfrm>
@@ -6758,10 +6826,9 @@
           <a:lstStyle/>
           <a:p>
             <a:r>
-              <a:rPr lang="en-US" dirty="0" smtClean="0"/>
+              <a:rPr lang="en-US" dirty="0"/>
               <a:t>Blend snapchat bar into the surrounding picture	</a:t>
             </a:r>
-            <a:endParaRPr lang="en-US" dirty="0"/>
           </a:p>
         </p:txBody>
       </p:sp>
@@ -6786,16 +6853,15 @@
           <a:lstStyle/>
           <a:p>
             <a:r>
-              <a:rPr lang="en-US" dirty="0" smtClean="0"/>
+              <a:rPr lang="en-US" dirty="0"/>
               <a:t>Average surrounding pixels into the picture</a:t>
             </a:r>
           </a:p>
           <a:p>
             <a:r>
-              <a:rPr lang="en-US" dirty="0" smtClean="0"/>
+              <a:rPr lang="en-US" dirty="0"/>
               <a:t>Take five random rows surrounding the bar and find the average difference between each RGB value of a random pixel within the bar in the same row</a:t>
             </a:r>
-            <a:endParaRPr lang="en-US" dirty="0"/>
           </a:p>
         </p:txBody>
       </p:sp>
@@ -6808,20 +6874,14 @@
           <p:nvPr/>
         </p:nvPicPr>
         <p:blipFill rotWithShape="1">
-          <a:blip r:embed="rId2" cstate="print">
-            <a:extLst>
-              <a:ext uri="{28A0092B-C50C-407E-A947-70E740481C1C}">
-                <a14:useLocalDpi xmlns:a14="http://schemas.microsoft.com/office/drawing/2010/main" val="0"/>
-              </a:ext>
-            </a:extLst>
-          </a:blip>
-          <a:srcRect l="9939" t="2243" r="10301" b="5991"/>
+          <a:blip r:embed="rId2"/>
+          <a:srcRect l="15266" t="1537" r="15632" b="8637"/>
           <a:stretch/>
         </p:blipFill>
         <p:spPr bwMode="auto">
           <a:xfrm>
-            <a:off x="8547252" y="303290"/>
-            <a:ext cx="3327422" cy="5803688"/>
+            <a:off x="8367387" y="372861"/>
+            <a:ext cx="3448792" cy="6245108"/>
           </a:xfrm>
           <a:prstGeom prst="rect">
             <a:avLst/>
@@ -6846,17 +6906,10 @@
   <p:clrMapOvr>
     <a:masterClrMapping/>
   </p:clrMapOvr>
-  <p:timing>
-    <p:tnLst>
-      <p:par>
-        <p:cTn id="1" dur="indefinite" restart="never" nodeType="tmRoot"/>
-      </p:par>
-    </p:tnLst>
-  </p:timing>
 </p:sld>
 </file>
 
-<file path=ppt/slides/slide6.xml><?xml version="1.0" encoding="utf-8"?>
+<file path=ppt/slides/slide8.xml><?xml version="1.0" encoding="utf-8"?>
 <p:sld xmlns:a="http://schemas.openxmlformats.org/drawingml/2006/main" xmlns:r="http://schemas.openxmlformats.org/officeDocument/2006/relationships" xmlns:p="http://schemas.openxmlformats.org/presentationml/2006/main">
   <p:cSld>
     <p:spTree>
@@ -6921,13 +6974,6 @@
   <p:clrMapOvr>
     <a:masterClrMapping/>
   </p:clrMapOvr>
-  <p:timing>
-    <p:tnLst>
-      <p:par>
-        <p:cTn id="1" dur="indefinite" restart="never" nodeType="tmRoot"/>
-      </p:par>
-    </p:tnLst>
-  </p:timing>
 </p:sld>
 </file>
 

</xml_diff>

<commit_message>
Different 2nd slide in presentation
</commit_message>
<xml_diff>
--- a/Snapchat Presentation.pptx
+++ b/Snapchat Presentation.pptx
@@ -6,7 +6,7 @@
   </p:sldMasterIdLst>
   <p:sldIdLst>
     <p:sldId id="256" r:id="rId2"/>
-    <p:sldId id="257" r:id="rId3"/>
+    <p:sldId id="264" r:id="rId3"/>
     <p:sldId id="261" r:id="rId4"/>
     <p:sldId id="258" r:id="rId5"/>
     <p:sldId id="262" r:id="rId6"/>
@@ -6170,43 +6170,12 @@
         </p:blipFill>
         <p:spPr>
           <a:xfrm flipH="1">
-            <a:off x="7555781" y="1615857"/>
+            <a:off x="8332904" y="1352811"/>
             <a:ext cx="2345874" cy="2072188"/>
           </a:xfrm>
           <a:prstGeom prst="rect">
             <a:avLst/>
           </a:prstGeom>
-        </p:spPr>
-      </p:pic>
-      <p:pic>
-        <p:nvPicPr>
-          <p:cNvPr id="4" name="Picture 3"/>
-          <p:cNvPicPr>
-            <a:picLocks noChangeAspect="1"/>
-          </p:cNvPicPr>
-          <p:nvPr/>
-        </p:nvPicPr>
-        <p:blipFill rotWithShape="1">
-          <a:blip r:embed="rId3"/>
-          <a:srcRect l="15266" t="4338" r="15632" b="8637"/>
-          <a:stretch/>
-        </p:blipFill>
-        <p:spPr bwMode="auto">
-          <a:xfrm>
-            <a:off x="3749287" y="87682"/>
-            <a:ext cx="3823376" cy="6707546"/>
-          </a:xfrm>
-          <a:prstGeom prst="rect">
-            <a:avLst/>
-          </a:prstGeom>
-          <a:ln>
-            <a:noFill/>
-          </a:ln>
-          <a:extLst>
-            <a:ext uri="{53640926-AAD7-44D8-BBD7-CCE9431645EC}">
-              <a14:shadowObscured xmlns:a14="http://schemas.microsoft.com/office/drawing/2010/main"/>
-            </a:ext>
-          </a:extLst>
         </p:spPr>
       </p:pic>
       <p:pic>
@@ -6217,15 +6186,56 @@
           </p:cNvPicPr>
           <p:nvPr/>
         </p:nvPicPr>
+        <p:blipFill>
+          <a:blip r:embed="rId3">
+            <a:extLst>
+              <a:ext uri="{28A0092B-C50C-407E-A947-70E740481C1C}">
+                <a14:useLocalDpi xmlns:a14="http://schemas.microsoft.com/office/drawing/2010/main" val="0"/>
+              </a:ext>
+            </a:extLst>
+          </a:blip>
+          <a:srcRect/>
+          <a:stretch>
+            <a:fillRect/>
+          </a:stretch>
+        </p:blipFill>
+        <p:spPr bwMode="auto">
+          <a:xfrm>
+            <a:off x="4543291" y="111699"/>
+            <a:ext cx="3789613" cy="6746301"/>
+          </a:xfrm>
+          <a:prstGeom prst="rect">
+            <a:avLst/>
+          </a:prstGeom>
+          <a:noFill/>
+          <a:ln>
+            <a:noFill/>
+          </a:ln>
+        </p:spPr>
+      </p:pic>
+      <p:pic>
+        <p:nvPicPr>
+          <p:cNvPr id="5" name="Picture 4"/>
+          <p:cNvPicPr>
+            <a:picLocks noChangeAspect="1"/>
+          </p:cNvPicPr>
+          <p:nvPr/>
+        </p:nvPicPr>
         <p:blipFill rotWithShape="1">
-          <a:blip r:embed="rId4"/>
-          <a:srcRect t="45460" b="49336"/>
+          <a:blip r:embed="rId4">
+            <a:extLst>
+              <a:ext uri="{28A0092B-C50C-407E-A947-70E740481C1C}">
+                <a14:useLocalDpi xmlns:a14="http://schemas.microsoft.com/office/drawing/2010/main" val="0"/>
+              </a:ext>
+            </a:extLst>
+          </a:blip>
+          <a:srcRect t="41508" b="53099"/>
           <a:stretch/>
         </p:blipFill>
         <p:spPr bwMode="auto">
           <a:xfrm>
-            <a:off x="3766168" y="3118980"/>
-            <a:ext cx="3789613" cy="350730"/>
+            <a:off x="4543293" y="2834730"/>
+            <a:ext cx="3789612" cy="363803"/>
           </a:xfrm>
           <a:prstGeom prst="rect">
             <a:avLst/>
@@ -6239,7 +6249,7 @@
     </p:spTree>
     <p:extLst>
       <p:ext uri="{BB962C8B-B14F-4D97-AF65-F5344CB8AC3E}">
-        <p14:creationId xmlns:p14="http://schemas.microsoft.com/office/powerpoint/2010/main" val="376378885"/>
+        <p14:creationId xmlns:p14="http://schemas.microsoft.com/office/powerpoint/2010/main" val="1900777400"/>
       </p:ext>
     </p:extLst>
   </p:cSld>
@@ -6358,7 +6368,7 @@
                                       <p:cBhvr additive="base">
                                         <p:cTn id="11" dur="1000"/>
                                         <p:tgtEl>
-                                          <p:spTgt spid="6"/>
+                                          <p:spTgt spid="5"/>
                                         </p:tgtEl>
                                         <p:attrNameLst>
                                           <p:attrName>ppt_x</p:attrName>
@@ -6381,7 +6391,7 @@
                                       <p:cBhvr additive="base">
                                         <p:cTn id="12" dur="1000"/>
                                         <p:tgtEl>
-                                          <p:spTgt spid="6"/>
+                                          <p:spTgt spid="5"/>
                                         </p:tgtEl>
                                         <p:attrNameLst>
                                           <p:attrName>ppt_y</p:attrName>
@@ -6408,7 +6418,7 @@
                                           </p:stCondLst>
                                         </p:cTn>
                                         <p:tgtEl>
-                                          <p:spTgt spid="6"/>
+                                          <p:spTgt spid="5"/>
                                         </p:tgtEl>
                                         <p:attrNameLst>
                                           <p:attrName>style.visibility</p:attrName>
@@ -6431,7 +6441,7 @@
                                       <p:cBhvr>
                                         <p:cTn id="15" dur="2000" fill="hold"/>
                                         <p:tgtEl>
-                                          <p:spTgt spid="6"/>
+                                          <p:spTgt spid="5"/>
                                         </p:tgtEl>
                                         <p:attrNameLst>
                                           <p:attrName>r</p:attrName>

</xml_diff>